<commit_message>
typo fixing once again
</commit_message>
<xml_diff>
--- a/Lectures/Lecture4.pptx
+++ b/Lectures/Lecture4.pptx
@@ -315,7 +315,7 @@
           <a:p>
             <a:fld id="{CBA08D16-15DC-4E25-BDC3-F25146157B16}" type="datetimeFigureOut">
               <a:rPr lang="ru-RU" smtClean="0"/>
-              <a:t>03.10.2024</a:t>
+              <a:t>22.10.2024</a:t>
             </a:fld>
             <a:endParaRPr lang="ru-RU"/>
           </a:p>
@@ -714,7 +714,7 @@
           <a:p>
             <a:fld id="{FCEC8293-DB51-454A-BE81-EC8FCB31EBA2}" type="datetime1">
               <a:rPr lang="ru-RU" smtClean="0"/>
-              <a:t>03.10.2024</a:t>
+              <a:t>22.10.2024</a:t>
             </a:fld>
             <a:endParaRPr lang="ru-RU"/>
           </a:p>
@@ -888,7 +888,7 @@
           <a:p>
             <a:fld id="{241C87B1-1C35-4DBD-BC18-2BC72E776603}" type="datetime1">
               <a:rPr lang="ru-RU" smtClean="0"/>
-              <a:t>03.10.2024</a:t>
+              <a:t>22.10.2024</a:t>
             </a:fld>
             <a:endParaRPr lang="ru-RU"/>
           </a:p>
@@ -1072,7 +1072,7 @@
           <a:p>
             <a:fld id="{3134C275-26C0-42CD-9111-9ADE65922AF9}" type="datetime1">
               <a:rPr lang="ru-RU" smtClean="0"/>
-              <a:t>03.10.2024</a:t>
+              <a:t>22.10.2024</a:t>
             </a:fld>
             <a:endParaRPr lang="ru-RU"/>
           </a:p>
@@ -1246,7 +1246,7 @@
           <a:p>
             <a:fld id="{C1A9A50B-C350-45F5-8AAB-ADB9E670AF2E}" type="datetime1">
               <a:rPr lang="ru-RU" smtClean="0"/>
-              <a:t>03.10.2024</a:t>
+              <a:t>22.10.2024</a:t>
             </a:fld>
             <a:endParaRPr lang="ru-RU"/>
           </a:p>
@@ -1496,7 +1496,7 @@
           <a:p>
             <a:fld id="{089688C9-348F-42F9-B6C0-5990DDE0C5B2}" type="datetime1">
               <a:rPr lang="ru-RU" smtClean="0"/>
-              <a:t>03.10.2024</a:t>
+              <a:t>22.10.2024</a:t>
             </a:fld>
             <a:endParaRPr lang="ru-RU"/>
           </a:p>
@@ -1732,7 +1732,7 @@
           <a:p>
             <a:fld id="{684AFD8F-6DD9-4AD3-A505-FDC3F5C5F3F6}" type="datetime1">
               <a:rPr lang="ru-RU" smtClean="0"/>
-              <a:t>03.10.2024</a:t>
+              <a:t>22.10.2024</a:t>
             </a:fld>
             <a:endParaRPr lang="ru-RU"/>
           </a:p>
@@ -2103,7 +2103,7 @@
           <a:p>
             <a:fld id="{63551EFE-4D02-45EB-A747-8B6F047B5AA0}" type="datetime1">
               <a:rPr lang="ru-RU" smtClean="0"/>
-              <a:t>03.10.2024</a:t>
+              <a:t>22.10.2024</a:t>
             </a:fld>
             <a:endParaRPr lang="ru-RU"/>
           </a:p>
@@ -2225,7 +2225,7 @@
           <a:p>
             <a:fld id="{813A9F34-E5CD-4B8F-AA9E-889C84372B20}" type="datetime1">
               <a:rPr lang="ru-RU" smtClean="0"/>
-              <a:t>03.10.2024</a:t>
+              <a:t>22.10.2024</a:t>
             </a:fld>
             <a:endParaRPr lang="ru-RU"/>
           </a:p>
@@ -2324,7 +2324,7 @@
           <a:p>
             <a:fld id="{51224D22-9B29-44A6-8E82-95FC492DEDC1}" type="datetime1">
               <a:rPr lang="ru-RU" smtClean="0"/>
-              <a:t>03.10.2024</a:t>
+              <a:t>22.10.2024</a:t>
             </a:fld>
             <a:endParaRPr lang="ru-RU"/>
           </a:p>
@@ -2605,7 +2605,7 @@
           <a:p>
             <a:fld id="{91D1034F-4441-48A1-BDC0-25EA1022324A}" type="datetime1">
               <a:rPr lang="ru-RU" smtClean="0"/>
-              <a:t>03.10.2024</a:t>
+              <a:t>22.10.2024</a:t>
             </a:fld>
             <a:endParaRPr lang="ru-RU"/>
           </a:p>
@@ -2862,7 +2862,7 @@
           <a:p>
             <a:fld id="{B0FFDE79-B627-473B-AE17-4C65BD2495F7}" type="datetime1">
               <a:rPr lang="ru-RU" smtClean="0"/>
-              <a:t>03.10.2024</a:t>
+              <a:t>22.10.2024</a:t>
             </a:fld>
             <a:endParaRPr lang="ru-RU"/>
           </a:p>
@@ -3079,7 +3079,7 @@
           <a:p>
             <a:fld id="{11CA537A-1B8C-47BA-9BA6-7CE3FAFDA8BE}" type="datetime1">
               <a:rPr lang="ru-RU" smtClean="0"/>
-              <a:t>03.10.2024</a:t>
+              <a:t>22.10.2024</a:t>
             </a:fld>
             <a:endParaRPr lang="ru-RU"/>
           </a:p>
@@ -3577,11 +3577,7 @@
           <a:p>
             <a:r>
               <a:rPr lang="ru-RU" dirty="0" smtClean="0"/>
-              <a:t>МИФИ </a:t>
-            </a:r>
-            <a:r>
-              <a:rPr lang="ru-RU" dirty="0" smtClean="0"/>
-              <a:t>202</a:t>
+              <a:t>МИФИ 202</a:t>
             </a:r>
             <a:r>
               <a:rPr lang="en-US" dirty="0"/>
@@ -25006,8 +25002,8 @@
           </a:p>
         </p:txBody>
       </p:sp>
-      <mc:AlternateContent xmlns:mc="http://schemas.openxmlformats.org/markup-compatibility/2006" xmlns:a14="http://schemas.microsoft.com/office/drawing/2010/main">
-        <mc:Choice Requires="a14">
+      <mc:AlternateContent xmlns:mc="http://schemas.openxmlformats.org/markup-compatibility/2006">
+        <mc:Choice xmlns:a14="http://schemas.microsoft.com/office/drawing/2010/main" Requires="a14">
           <p:sp>
             <p:nvSpPr>
               <p:cNvPr id="3" name="Объект 2"/>
@@ -25027,11 +25023,11 @@
                   <a:buNone/>
                 </a:pPr>
                 <a:r>
-                  <a:rPr lang="ru-RU" b="1" dirty="0" smtClean="0"/>
+                  <a:rPr lang="ru-RU" b="1" dirty="0"/>
                   <a:t>Теорема 4.1. </a:t>
                 </a:r>
                 <a:r>
-                  <a:rPr lang="ru-RU" dirty="0" smtClean="0"/>
+                  <a:rPr lang="ru-RU" dirty="0"/>
                   <a:t>Пусть</a:t>
                 </a:r>
                 <a:r>
@@ -25135,7 +25131,49 @@
                 </a14:m>
                 <a:r>
                   <a:rPr lang="ru-RU" dirty="0"/>
-                  <a:t> – стойкий, то </a:t>
+                  <a:t> – стойкий,</a:t>
+                </a:r>
+                <a:r>
+                  <a:rPr lang="en-US" dirty="0"/>
+                  <a:t> </a:t>
+                </a:r>
+                <a14:m>
+                  <m:oMath xmlns:m="http://schemas.openxmlformats.org/officeDocument/2006/math">
+                    <m:r>
+                      <a:rPr lang="en-US" i="1" dirty="0">
+                        <a:latin typeface="Cambria Math" panose="02040503050406030204" pitchFamily="18" charset="0"/>
+                      </a:rPr>
+                      <m:t>|</m:t>
+                    </m:r>
+                    <m:r>
+                      <a:rPr lang="en-US" i="1" dirty="0">
+                        <a:latin typeface="Cambria Math" panose="02040503050406030204" pitchFamily="18" charset="0"/>
+                      </a:rPr>
+                      <m:t>𝑋</m:t>
+                    </m:r>
+                    <m:r>
+                      <a:rPr lang="en-US" i="1" dirty="0">
+                        <a:latin typeface="Cambria Math" panose="02040503050406030204" pitchFamily="18" charset="0"/>
+                      </a:rPr>
+                      <m:t>|</m:t>
+                    </m:r>
+                  </m:oMath>
+                </a14:m>
+                <a:r>
+                  <a:rPr lang="en-US" dirty="0"/>
+                  <a:t> -</a:t>
+                </a:r>
+                <a:r>
+                  <a:rPr lang="ru-RU" dirty="0"/>
+                  <a:t> </a:t>
+                </a:r>
+                <a:r>
+                  <a:rPr lang="ru-RU" dirty="0" err="1"/>
+                  <a:t>сверх-полиномиальная</a:t>
+                </a:r>
+                <a:r>
+                  <a:rPr lang="ru-RU" dirty="0"/>
+                  <a:t>, то </a:t>
                 </a:r>
                 <a14:m>
                   <m:oMath xmlns:m="http://schemas.openxmlformats.org/officeDocument/2006/math">
@@ -25469,7 +25507,7 @@
             </p:txBody>
           </p:sp>
         </mc:Choice>
-        <mc:Fallback xmlns="">
+        <mc:Fallback>
           <p:sp>
             <p:nvSpPr>
               <p:cNvPr id="3" name="Объект 2"/>
@@ -25481,7 +25519,7 @@
               </p:nvPr>
             </p:nvSpPr>
             <p:spPr>
-              <a:blipFill>
+              <a:blipFill rotWithShape="0">
                 <a:blip r:embed="rId2"/>
                 <a:stretch>
                   <a:fillRect l="-1043" t="-2101"/>

</xml_diff>